<commit_message>
Few changes and enhancements to doc and ppt task1
</commit_message>
<xml_diff>
--- a/Tasks/FA23BCS117_FA23BCS108_Task1_DecisionTrees/FA23BCS117_FA23BCS108_Task1_DecisionTrees.pptx
+++ b/Tasks/FA23BCS117_FA23BCS108_Task1_DecisionTrees/FA23BCS117_FA23BCS108_Task1_DecisionTrees.pptx
@@ -313,7 +313,7 @@
           <a:p>
             <a:fld id="{5BCAD085-E8A6-8845-BD4E-CB4CCA059FC4}" type="datetimeFigureOut">
               <a:rPr lang="en-US" smtClean="0"/>
-              <a:t>9/25/2025</a:t>
+              <a:t>9/27/2025</a:t>
             </a:fld>
             <a:endParaRPr lang="en-US"/>
           </a:p>
@@ -580,7 +580,7 @@
           <a:p>
             <a:fld id="{5BCAD085-E8A6-8845-BD4E-CB4CCA059FC4}" type="datetimeFigureOut">
               <a:rPr lang="en-US" smtClean="0"/>
-              <a:t>9/25/2025</a:t>
+              <a:t>9/27/2025</a:t>
             </a:fld>
             <a:endParaRPr lang="en-US"/>
           </a:p>
@@ -811,7 +811,7 @@
           <a:p>
             <a:fld id="{5BCAD085-E8A6-8845-BD4E-CB4CCA059FC4}" type="datetimeFigureOut">
               <a:rPr lang="en-US" smtClean="0"/>
-              <a:t>9/25/2025</a:t>
+              <a:t>9/27/2025</a:t>
             </a:fld>
             <a:endParaRPr lang="en-US"/>
           </a:p>
@@ -1121,7 +1121,7 @@
           <a:p>
             <a:fld id="{5BCAD085-E8A6-8845-BD4E-CB4CCA059FC4}" type="datetimeFigureOut">
               <a:rPr lang="en-US" smtClean="0"/>
-              <a:t>9/25/2025</a:t>
+              <a:t>9/27/2025</a:t>
             </a:fld>
             <a:endParaRPr lang="en-US"/>
           </a:p>
@@ -1594,7 +1594,7 @@
           <a:p>
             <a:fld id="{5BCAD085-E8A6-8845-BD4E-CB4CCA059FC4}" type="datetimeFigureOut">
               <a:rPr lang="en-US" smtClean="0"/>
-              <a:t>9/25/2025</a:t>
+              <a:t>9/27/2025</a:t>
             </a:fld>
             <a:endParaRPr lang="en-US"/>
           </a:p>
@@ -2141,7 +2141,7 @@
           <a:p>
             <a:fld id="{5BCAD085-E8A6-8845-BD4E-CB4CCA059FC4}" type="datetimeFigureOut">
               <a:rPr lang="en-US" smtClean="0"/>
-              <a:t>9/25/2025</a:t>
+              <a:t>9/27/2025</a:t>
             </a:fld>
             <a:endParaRPr lang="en-US"/>
           </a:p>
@@ -2915,7 +2915,7 @@
           <a:p>
             <a:fld id="{5BCAD085-E8A6-8845-BD4E-CB4CCA059FC4}" type="datetimeFigureOut">
               <a:rPr lang="en-US" smtClean="0"/>
-              <a:t>9/25/2025</a:t>
+              <a:t>9/27/2025</a:t>
             </a:fld>
             <a:endParaRPr lang="en-US"/>
           </a:p>
@@ -3090,7 +3090,7 @@
           <a:p>
             <a:fld id="{5BCAD085-E8A6-8845-BD4E-CB4CCA059FC4}" type="datetimeFigureOut">
               <a:rPr lang="en-US" smtClean="0"/>
-              <a:t>9/25/2025</a:t>
+              <a:t>9/27/2025</a:t>
             </a:fld>
             <a:endParaRPr lang="en-US"/>
           </a:p>
@@ -3313,7 +3313,7 @@
           <a:p>
             <a:fld id="{5BCAD085-E8A6-8845-BD4E-CB4CCA059FC4}" type="datetimeFigureOut">
               <a:rPr lang="en-US" smtClean="0"/>
-              <a:t>9/25/2025</a:t>
+              <a:t>9/27/2025</a:t>
             </a:fld>
             <a:endParaRPr lang="en-US"/>
           </a:p>
@@ -3493,7 +3493,7 @@
           <a:p>
             <a:fld id="{5BCAD085-E8A6-8845-BD4E-CB4CCA059FC4}" type="datetimeFigureOut">
               <a:rPr lang="en-US" smtClean="0"/>
-              <a:t>9/25/2025</a:t>
+              <a:t>9/27/2025</a:t>
             </a:fld>
             <a:endParaRPr lang="en-US"/>
           </a:p>
@@ -3782,7 +3782,7 @@
           <a:p>
             <a:fld id="{5BCAD085-E8A6-8845-BD4E-CB4CCA059FC4}" type="datetimeFigureOut">
               <a:rPr lang="en-US" smtClean="0"/>
-              <a:t>9/25/2025</a:t>
+              <a:t>9/27/2025</a:t>
             </a:fld>
             <a:endParaRPr lang="en-US"/>
           </a:p>
@@ -4024,7 +4024,7 @@
           <a:p>
             <a:fld id="{5BCAD085-E8A6-8845-BD4E-CB4CCA059FC4}" type="datetimeFigureOut">
               <a:rPr lang="en-US" smtClean="0"/>
-              <a:t>9/25/2025</a:t>
+              <a:t>9/27/2025</a:t>
             </a:fld>
             <a:endParaRPr lang="en-US"/>
           </a:p>
@@ -4403,7 +4403,7 @@
           <a:p>
             <a:fld id="{5BCAD085-E8A6-8845-BD4E-CB4CCA059FC4}" type="datetimeFigureOut">
               <a:rPr lang="en-US" smtClean="0"/>
-              <a:t>9/25/2025</a:t>
+              <a:t>9/27/2025</a:t>
             </a:fld>
             <a:endParaRPr lang="en-US"/>
           </a:p>
@@ -4521,7 +4521,7 @@
           <a:p>
             <a:fld id="{5BCAD085-E8A6-8845-BD4E-CB4CCA059FC4}" type="datetimeFigureOut">
               <a:rPr lang="en-US" smtClean="0"/>
-              <a:t>9/25/2025</a:t>
+              <a:t>9/27/2025</a:t>
             </a:fld>
             <a:endParaRPr lang="en-US"/>
           </a:p>
@@ -4616,7 +4616,7 @@
           <a:p>
             <a:fld id="{5BCAD085-E8A6-8845-BD4E-CB4CCA059FC4}" type="datetimeFigureOut">
               <a:rPr lang="en-US" smtClean="0"/>
-              <a:t>9/25/2025</a:t>
+              <a:t>9/27/2025</a:t>
             </a:fld>
             <a:endParaRPr lang="en-US"/>
           </a:p>
@@ -4865,7 +4865,7 @@
           <a:p>
             <a:fld id="{5BCAD085-E8A6-8845-BD4E-CB4CCA059FC4}" type="datetimeFigureOut">
               <a:rPr lang="en-US" smtClean="0"/>
-              <a:t>9/25/2025</a:t>
+              <a:t>9/27/2025</a:t>
             </a:fld>
             <a:endParaRPr lang="en-US"/>
           </a:p>
@@ -5122,7 +5122,7 @@
           <a:p>
             <a:fld id="{5BCAD085-E8A6-8845-BD4E-CB4CCA059FC4}" type="datetimeFigureOut">
               <a:rPr lang="en-US" smtClean="0"/>
-              <a:t>9/25/2025</a:t>
+              <a:t>9/27/2025</a:t>
             </a:fld>
             <a:endParaRPr lang="en-US"/>
           </a:p>
@@ -5365,7 +5365,7 @@
           <a:p>
             <a:fld id="{5BCAD085-E8A6-8845-BD4E-CB4CCA059FC4}" type="datetimeFigureOut">
               <a:rPr lang="en-US" smtClean="0"/>
-              <a:t>9/25/2025</a:t>
+              <a:t>9/27/2025</a:t>
             </a:fld>
             <a:endParaRPr lang="en-US"/>
           </a:p>
@@ -5947,19 +5947,49 @@
           <a:p>
             <a:r>
               <a:rPr dirty="0"/>
-              <a:t>All 30 features → 94% accuracy</a:t>
-            </a:r>
-          </a:p>
-          <a:p>
+              <a:t>All 30 features </a:t>
+            </a:r>
+            <a:r>
+              <a:rPr lang="en-US" dirty="0">
+                <a:sym typeface="Wingdings" panose="05000000000000000000" pitchFamily="2" charset="2"/>
+              </a:rPr>
+              <a:t></a:t>
+            </a:r>
             <a:r>
               <a:rPr dirty="0"/>
-              <a:t>Reduced set (3 features) → 84%</a:t>
+              <a:t> 94% accuracy</a:t>
             </a:r>
           </a:p>
           <a:p>
             <a:r>
               <a:rPr dirty="0"/>
-              <a:t>PCA (5 components) → 91%</a:t>
+              <a:t>Reduced set (3 features) </a:t>
+            </a:r>
+            <a:r>
+              <a:rPr lang="en-US" dirty="0">
+                <a:sym typeface="Wingdings" panose="05000000000000000000" pitchFamily="2" charset="2"/>
+              </a:rPr>
+              <a:t> </a:t>
+            </a:r>
+            <a:r>
+              <a:rPr dirty="0"/>
+              <a:t>84%</a:t>
+            </a:r>
+          </a:p>
+          <a:p>
+            <a:r>
+              <a:rPr dirty="0"/>
+              <a:t>PCA (5 components) </a:t>
+            </a:r>
+            <a:r>
+              <a:rPr lang="en-US" dirty="0">
+                <a:sym typeface="Wingdings" panose="05000000000000000000" pitchFamily="2" charset="2"/>
+              </a:rPr>
+              <a:t></a:t>
+            </a:r>
+            <a:r>
+              <a:rPr dirty="0"/>
+              <a:t> 91%</a:t>
             </a:r>
           </a:p>
           <a:p>
@@ -5967,8 +5997,12 @@
               <a:buNone/>
             </a:pPr>
             <a:r>
+              <a:rPr b="1" i="1" dirty="0"/>
+              <a:t>Tradeoff: </a:t>
+            </a:r>
+            <a:r>
               <a:rPr i="1" dirty="0"/>
-              <a:t>Tradeoff: Interpretability vs Performance</a:t>
+              <a:t>Interpretability vs Performance</a:t>
             </a:r>
           </a:p>
         </p:txBody>
@@ -7543,27 +7577,56 @@
           <a:lstStyle/>
           <a:p>
             <a:r>
-              <a:t>Source: sklearn Breast Cancer Dataset</a:t>
-            </a:r>
-          </a:p>
-          <a:p>
-            <a:r>
-              <a:t>Samples: 569 cases</a:t>
-            </a:r>
-          </a:p>
-          <a:p>
-            <a:r>
-              <a:t>Classes: Malignant, Benign</a:t>
-            </a:r>
-          </a:p>
-          <a:p>
-            <a:r>
-              <a:t>Features: 30 numerical features</a:t>
-            </a:r>
-          </a:p>
-          <a:p>
-            <a:r>
-              <a:t>Each feature: mean, std error, worst value.</a:t>
+              <a:rPr b="1" dirty="0"/>
+              <a:t>Source: </a:t>
+            </a:r>
+            <a:r>
+              <a:rPr dirty="0" err="1"/>
+              <a:t>sklearn</a:t>
+            </a:r>
+            <a:r>
+              <a:rPr dirty="0"/>
+              <a:t> Breast Cancer Dataset</a:t>
+            </a:r>
+          </a:p>
+          <a:p>
+            <a:r>
+              <a:rPr b="1" dirty="0"/>
+              <a:t>Samples: </a:t>
+            </a:r>
+            <a:r>
+              <a:rPr dirty="0"/>
+              <a:t>569 cases</a:t>
+            </a:r>
+          </a:p>
+          <a:p>
+            <a:r>
+              <a:rPr b="1" dirty="0"/>
+              <a:t>Classes: </a:t>
+            </a:r>
+            <a:r>
+              <a:rPr dirty="0"/>
+              <a:t>Malignant, Benign</a:t>
+            </a:r>
+          </a:p>
+          <a:p>
+            <a:r>
+              <a:rPr b="1" dirty="0"/>
+              <a:t>Features: </a:t>
+            </a:r>
+            <a:r>
+              <a:rPr dirty="0"/>
+              <a:t>30 numerical features</a:t>
+            </a:r>
+          </a:p>
+          <a:p>
+            <a:r>
+              <a:rPr b="1" dirty="0"/>
+              <a:t>Each feature: </a:t>
+            </a:r>
+            <a:r>
+              <a:rPr dirty="0"/>
+              <a:t>mean, std error, worst value.</a:t>
             </a:r>
           </a:p>
         </p:txBody>

</xml_diff>